<commit_message>
add images to poster
</commit_message>
<xml_diff>
--- a/Project Documents/Spring 2025/PICA poster.pptx
+++ b/Project Documents/Spring 2025/PICA poster.pptx
@@ -1696,10 +1696,27 @@
               <a:rPr lang="en-US" sz="4800" dirty="0"/>
               <a:t>Allows doctors to better understand their patients and create stronger treatment plans</a:t>
             </a:r>
-          </a:p>
-          <a:p>
-            <a:pPr lvl="0"/>
-            <a:endParaRPr lang="en-US" b="1" u="sng" dirty="0"/>
+            <a:endParaRPr lang="en-US" sz="4800" b="1" u="sng" dirty="0"/>
+          </a:p>
+          <a:p>
+            <a:pPr lvl="0" algn="l">
+              <a:buFont typeface="Arial" panose="020B0604020202020204" pitchFamily="34" charset="0"/>
+              <a:buChar char="•"/>
+            </a:pPr>
+            <a:r>
+              <a:rPr lang="en-US" sz="4800" dirty="0"/>
+              <a:t>Helps users to get a better understanding of themselves and their personality structure</a:t>
+            </a:r>
+          </a:p>
+          <a:p>
+            <a:pPr lvl="0" algn="l">
+              <a:buFont typeface="Arial" panose="020B0604020202020204" pitchFamily="34" charset="0"/>
+              <a:buChar char="•"/>
+            </a:pPr>
+            <a:r>
+              <a:rPr lang="en-US" sz="4800" dirty="0"/>
+              <a:t>Gathers more data about how a patient’s temperament affects their response to treatment</a:t>
+            </a:r>
           </a:p>
         </p:txBody>
       </p:sp>
@@ -2610,24 +2627,29 @@
             </a:endParaRPr>
           </a:p>
           <a:p>
-            <a:pPr marR="0" lvl="0" algn="ctr" defTabSz="4389120" rtl="0" eaLnBrk="1" fontAlgn="auto" latinLnBrk="0" hangingPunct="1">
-              <a:lnSpc>
-                <a:spcPct val="100000"/>
-              </a:lnSpc>
-              <a:spcBef>
-                <a:spcPct val="20000"/>
-              </a:spcBef>
-              <a:spcAft>
-                <a:spcPts val="0"/>
-              </a:spcAft>
-              <a:buClrTx/>
-              <a:buSzTx/>
-              <a:tabLst/>
-              <a:defRPr/>
-            </a:pPr>
-            <a:endParaRPr lang="en-US" sz="6000" dirty="0">
-              <a:latin typeface="+mj-lt"/>
-            </a:endParaRPr>
+            <a:pPr marL="1645920" marR="0" lvl="0" indent="-1645920" algn="l" defTabSz="4389120" rtl="0" eaLnBrk="1" fontAlgn="auto" latinLnBrk="0" hangingPunct="1">
+              <a:lnSpc>
+                <a:spcPct val="100000"/>
+              </a:lnSpc>
+              <a:spcBef>
+                <a:spcPct val="20000"/>
+              </a:spcBef>
+              <a:spcAft>
+                <a:spcPts val="0"/>
+              </a:spcAft>
+              <a:buClrTx/>
+              <a:buSzTx/>
+              <a:buFont typeface="Arial" panose="020B0604020202020204" pitchFamily="34" charset="0"/>
+              <a:buChar char="•"/>
+              <a:tabLst/>
+              <a:defRPr/>
+            </a:pPr>
+            <a:r>
+              <a:rPr lang="en-US" sz="4800" dirty="0">
+                <a:latin typeface="+mj-lt"/>
+              </a:rPr>
+              <a:t>Coded with Flask and Python</a:t>
+            </a:r>
           </a:p>
           <a:p>
             <a:pPr marR="0" lvl="0" algn="ctr" defTabSz="4389120" rtl="0" eaLnBrk="1" fontAlgn="auto" latinLnBrk="0" hangingPunct="1">
@@ -2909,8 +2931,12 @@
               <a:buChar char="•"/>
             </a:pPr>
             <a:r>
+              <a:rPr lang="en-US" sz="4800" b="1" dirty="0"/>
+              <a:t>MongoDB Atlas</a:t>
+            </a:r>
+            <a:r>
               <a:rPr lang="en-US" sz="4800" dirty="0"/>
-              <a:t>MongoDB Atlas: A cloud-based NoSQL database used to securely store survey and emotional pattern data</a:t>
+              <a:t>: A cloud-based NoSQL database used to securely store survey and emotional pattern data</a:t>
             </a:r>
           </a:p>
           <a:p>
@@ -2919,8 +2945,12 @@
               <a:buChar char="•"/>
             </a:pPr>
             <a:r>
+              <a:rPr lang="en-US" sz="4800" b="1" dirty="0"/>
+              <a:t>PythonAnywhere</a:t>
+            </a:r>
+            <a:r>
               <a:rPr lang="en-US" sz="4800" dirty="0"/>
-              <a:t>PythonAnywhere: A cloud platform used to host and deploy the web application</a:t>
+              <a:t>: A cloud platform used to host and deploy the web application</a:t>
             </a:r>
           </a:p>
           <a:p>
@@ -2928,6 +2958,83 @@
           </a:p>
         </p:txBody>
       </p:sp>
+      <p:pic>
+        <p:nvPicPr>
+          <p:cNvPr id="11" name="Picture 10">
+            <a:extLst>
+              <a:ext uri="{FF2B5EF4-FFF2-40B4-BE49-F238E27FC236}">
+                <a16:creationId xmlns:a16="http://schemas.microsoft.com/office/drawing/2014/main" id="{BB665AE8-AF0C-79A8-A7AC-9C60BAA85188}"/>
+              </a:ext>
+            </a:extLst>
+          </p:cNvPr>
+          <p:cNvPicPr>
+            <a:picLocks noChangeAspect="1"/>
+          </p:cNvPicPr>
+          <p:nvPr/>
+        </p:nvPicPr>
+        <p:blipFill>
+          <a:blip r:embed="rId3"/>
+          <a:stretch>
+            <a:fillRect/>
+          </a:stretch>
+        </p:blipFill>
+        <p:spPr>
+          <a:xfrm>
+            <a:off x="15049500" y="17678401"/>
+            <a:ext cx="13844016" cy="3215850"/>
+          </a:xfrm>
+          <a:prstGeom prst="rect">
+            <a:avLst/>
+          </a:prstGeom>
+          <a:ln>
+            <a:solidFill>
+              <a:schemeClr val="bg1">
+                <a:lumMod val="75000"/>
+              </a:schemeClr>
+            </a:solidFill>
+          </a:ln>
+        </p:spPr>
+      </p:pic>
+      <p:pic>
+        <p:nvPicPr>
+          <p:cNvPr id="13" name="Picture 12">
+            <a:extLst>
+              <a:ext uri="{FF2B5EF4-FFF2-40B4-BE49-F238E27FC236}">
+                <a16:creationId xmlns:a16="http://schemas.microsoft.com/office/drawing/2014/main" id="{09FC9648-A982-81CD-7932-DAB54BDD263F}"/>
+              </a:ext>
+            </a:extLst>
+          </p:cNvPr>
+          <p:cNvPicPr>
+            <a:picLocks noChangeAspect="1"/>
+          </p:cNvPicPr>
+          <p:nvPr/>
+        </p:nvPicPr>
+        <p:blipFill>
+          <a:blip r:embed="rId4"/>
+          <a:stretch>
+            <a:fillRect/>
+          </a:stretch>
+        </p:blipFill>
+        <p:spPr>
+          <a:xfrm>
+            <a:off x="15049501" y="21427652"/>
+            <a:ext cx="13844016" cy="8461538"/>
+          </a:xfrm>
+          <a:prstGeom prst="rect">
+            <a:avLst/>
+          </a:prstGeom>
+          <a:solidFill>
+            <a:schemeClr val="accent2"/>
+          </a:solidFill>
+          <a:ln>
+            <a:solidFill>
+              <a:schemeClr val="bg1">
+                <a:lumMod val="75000"/>
+              </a:schemeClr>
+            </a:solidFill>
+          </a:ln>
+        </p:spPr>
+      </p:pic>
     </p:spTree>
   </p:cSld>
   <p:clrMapOvr>

</xml_diff>